<commit_message>
ánh vừa sửa phần slide của ánh
</commit_message>
<xml_diff>
--- a/Slide.pptx
+++ b/Slide.pptx
@@ -267,7 +267,7 @@
       <p15:sldGuideLst xmlns:p15="http://schemas.microsoft.com/office/powerpoint/2012/main"/>
     </p:ext>
     <p:ext uri="GoogleSlidesCustomDataVersion2">
-      <go:slidesCustomData xmlns="" xmlns:mc="http://schemas.openxmlformats.org/markup-compatibility/2006" xmlns:mv="urn:schemas-microsoft-com:mac:vml" xmlns:c="http://schemas.openxmlformats.org/drawingml/2006/chart" xmlns:dgm="http://schemas.openxmlformats.org/drawingml/2006/diagram" xmlns:o="urn:schemas-microsoft-com:office:office" xmlns:v="urn:schemas-microsoft-com:vml" xmlns:pvml="urn:schemas-microsoft-com:office:powerpoint" xmlns:com="http://schemas.openxmlformats.org/drawingml/2006/compatibility" xmlns:p14="http://schemas.microsoft.com/office/powerpoint/2010/main" xmlns:p15="http://schemas.microsoft.com/office/powerpoint/2012/main" xmlns:ahyp="http://schemas.microsoft.com/office/drawing/2018/hyperlinkcolor" xmlns:go="http://customooxmlschemas.google.com/" r:id="rId34" roundtripDataSignature="AMtx7mgzalF4DGvfEshU7BVqSP7oz0qtVA=="/>
+      <go:slidesCustomData xmlns:go="http://customooxmlschemas.google.com/" xmlns:ahyp="http://schemas.microsoft.com/office/drawing/2018/hyperlinkcolor" xmlns:p15="http://schemas.microsoft.com/office/powerpoint/2012/main" xmlns:p14="http://schemas.microsoft.com/office/powerpoint/2010/main" xmlns:com="http://schemas.openxmlformats.org/drawingml/2006/compatibility" xmlns:pvml="urn:schemas-microsoft-com:office:powerpoint" xmlns:v="urn:schemas-microsoft-com:vml" xmlns:o="urn:schemas-microsoft-com:office:office" xmlns:dgm="http://schemas.openxmlformats.org/drawingml/2006/diagram" xmlns:c="http://schemas.openxmlformats.org/drawingml/2006/chart" xmlns:mv="urn:schemas-microsoft-com:mac:vml" xmlns:mc="http://schemas.openxmlformats.org/markup-compatibility/2006" xmlns="" r:id="rId34" roundtripDataSignature="AMtx7mgzalF4DGvfEshU7BVqSP7oz0qtVA=="/>
     </p:ext>
   </p:extLst>
 </p:presentation>
@@ -17522,7 +17522,9 @@
         </p:nvSpPr>
         <p:spPr/>
         <p:txBody>
-          <a:bodyPr/>
+          <a:bodyPr>
+            <a:normAutofit lnSpcReduction="10000"/>
+          </a:bodyPr>
           <a:lstStyle/>
           <a:p>
             <a:pPr>
@@ -17567,24 +17569,7 @@
             </a:r>
             <a:r>
               <a:rPr lang="en-US" b="1" dirty="0"/>
-              <a:t> </a:t>
-            </a:r>
-          </a:p>
-          <a:p>
-            <a:pPr marL="114300" indent="0">
-              <a:buNone/>
-            </a:pPr>
-            <a:r>
-              <a:rPr lang="en-US" dirty="0"/>
-              <a:t>	</a:t>
-            </a:r>
-            <a:r>
-              <a:rPr lang="en-US" dirty="0" err="1"/>
-              <a:t>Cần</a:t>
-            </a:r>
-            <a:r>
-              <a:rPr lang="en-US" dirty="0"/>
-              <a:t> </a:t>
+              <a:t>: </a:t>
             </a:r>
             <a:r>
               <a:rPr lang="en-US" dirty="0" err="1"/>
@@ -17621,216 +17606,6 @@
             <a:r>
               <a:rPr lang="en-US" dirty="0" err="1"/>
               <a:t>hỏi</a:t>
-            </a:r>
-            <a:r>
-              <a:rPr lang="en-US" dirty="0"/>
-              <a:t>:</a:t>
-            </a:r>
-          </a:p>
-          <a:p>
-            <a:pPr>
-              <a:buFont typeface="Arial" panose="020B0604020202020204" pitchFamily="34" charset="0"/>
-              <a:buChar char="•"/>
-            </a:pPr>
-            <a:r>
-              <a:rPr lang="en-US" dirty="0"/>
-              <a:t>Ai </a:t>
-            </a:r>
-            <a:r>
-              <a:rPr lang="en-US" dirty="0" err="1"/>
-              <a:t>sẽ</a:t>
-            </a:r>
-            <a:r>
-              <a:rPr lang="en-US" dirty="0"/>
-              <a:t> </a:t>
-            </a:r>
-            <a:r>
-              <a:rPr lang="en-US" dirty="0" err="1"/>
-              <a:t>cung</a:t>
-            </a:r>
-            <a:r>
-              <a:rPr lang="en-US" dirty="0"/>
-              <a:t> </a:t>
-            </a:r>
-            <a:r>
-              <a:rPr lang="en-US" dirty="0" err="1"/>
-              <a:t>cấp</a:t>
-            </a:r>
-            <a:r>
-              <a:rPr lang="en-US" dirty="0"/>
-              <a:t>, </a:t>
-            </a:r>
-            <a:r>
-              <a:rPr lang="en-US" dirty="0" err="1"/>
-              <a:t>sử</a:t>
-            </a:r>
-            <a:r>
-              <a:rPr lang="en-US" dirty="0"/>
-              <a:t> </a:t>
-            </a:r>
-            <a:r>
-              <a:rPr lang="en-US" dirty="0" err="1"/>
-              <a:t>dụng</a:t>
-            </a:r>
-            <a:r>
-              <a:rPr lang="en-US" dirty="0"/>
-              <a:t>, </a:t>
-            </a:r>
-            <a:r>
-              <a:rPr lang="en-US" dirty="0" err="1"/>
-              <a:t>hoặc</a:t>
-            </a:r>
-            <a:r>
-              <a:rPr lang="en-US" dirty="0"/>
-              <a:t> </a:t>
-            </a:r>
-            <a:r>
-              <a:rPr lang="en-US" dirty="0" err="1"/>
-              <a:t>loại</a:t>
-            </a:r>
-            <a:r>
-              <a:rPr lang="en-US" dirty="0"/>
-              <a:t> </a:t>
-            </a:r>
-            <a:r>
-              <a:rPr lang="en-US" dirty="0" err="1"/>
-              <a:t>bỏ</a:t>
-            </a:r>
-            <a:r>
-              <a:rPr lang="en-US" dirty="0"/>
-              <a:t> </a:t>
-            </a:r>
-            <a:r>
-              <a:rPr lang="en-US" dirty="0" err="1"/>
-              <a:t>thông</a:t>
-            </a:r>
-            <a:r>
-              <a:rPr lang="en-US" dirty="0"/>
-              <a:t> tin </a:t>
-            </a:r>
-            <a:r>
-              <a:rPr lang="en-US" dirty="0" err="1"/>
-              <a:t>trong</a:t>
-            </a:r>
-            <a:r>
-              <a:rPr lang="en-US" dirty="0"/>
-              <a:t> </a:t>
-            </a:r>
-            <a:r>
-              <a:rPr lang="en-US" dirty="0" err="1"/>
-              <a:t>hệ</a:t>
-            </a:r>
-            <a:r>
-              <a:rPr lang="en-US" dirty="0"/>
-              <a:t> </a:t>
-            </a:r>
-            <a:r>
-              <a:rPr lang="en-US" dirty="0" err="1"/>
-              <a:t>thống</a:t>
-            </a:r>
-            <a:r>
-              <a:rPr lang="en-US" dirty="0"/>
-              <a:t>?</a:t>
-            </a:r>
-          </a:p>
-          <a:p>
-            <a:pPr>
-              <a:buFont typeface="Arial" panose="020B0604020202020204" pitchFamily="34" charset="0"/>
-              <a:buChar char="•"/>
-            </a:pPr>
-            <a:r>
-              <a:rPr lang="en-US" dirty="0"/>
-              <a:t>Ai </a:t>
-            </a:r>
-            <a:r>
-              <a:rPr lang="en-US" dirty="0" err="1"/>
-              <a:t>sẽ</a:t>
-            </a:r>
-            <a:r>
-              <a:rPr lang="en-US" dirty="0"/>
-              <a:t> </a:t>
-            </a:r>
-            <a:r>
-              <a:rPr lang="en-US" dirty="0" err="1"/>
-              <a:t>sử</a:t>
-            </a:r>
-            <a:r>
-              <a:rPr lang="en-US" dirty="0"/>
-              <a:t> </a:t>
-            </a:r>
-            <a:r>
-              <a:rPr lang="en-US" dirty="0" err="1"/>
-              <a:t>dụng</a:t>
-            </a:r>
-            <a:r>
-              <a:rPr lang="en-US" dirty="0"/>
-              <a:t> </a:t>
-            </a:r>
-            <a:r>
-              <a:rPr lang="en-US" dirty="0" err="1"/>
-              <a:t>các</a:t>
-            </a:r>
-            <a:r>
-              <a:rPr lang="en-US" dirty="0"/>
-              <a:t> </a:t>
-            </a:r>
-            <a:r>
-              <a:rPr lang="en-US" dirty="0" err="1"/>
-              <a:t>chức</a:t>
-            </a:r>
-            <a:r>
-              <a:rPr lang="en-US" dirty="0"/>
-              <a:t> </a:t>
-            </a:r>
-            <a:r>
-              <a:rPr lang="en-US" dirty="0" err="1"/>
-              <a:t>năng</a:t>
-            </a:r>
-            <a:r>
-              <a:rPr lang="en-US" dirty="0"/>
-              <a:t> </a:t>
-            </a:r>
-            <a:r>
-              <a:rPr lang="en-US" dirty="0" err="1"/>
-              <a:t>này</a:t>
-            </a:r>
-            <a:r>
-              <a:rPr lang="en-US" dirty="0"/>
-              <a:t> </a:t>
-            </a:r>
-            <a:r>
-              <a:rPr lang="en-US" dirty="0" err="1"/>
-              <a:t>của</a:t>
-            </a:r>
-            <a:r>
-              <a:rPr lang="en-US" dirty="0"/>
-              <a:t> </a:t>
-            </a:r>
-            <a:r>
-              <a:rPr lang="en-US" dirty="0" err="1"/>
-              <a:t>hệ</a:t>
-            </a:r>
-            <a:r>
-              <a:rPr lang="en-US" dirty="0"/>
-              <a:t> </a:t>
-            </a:r>
-            <a:r>
-              <a:rPr lang="en-US" dirty="0" err="1"/>
-              <a:t>thống</a:t>
-            </a:r>
-            <a:r>
-              <a:rPr lang="en-US" dirty="0"/>
-              <a:t>?</a:t>
-            </a:r>
-          </a:p>
-          <a:p>
-            <a:pPr>
-              <a:buFont typeface="Arial" panose="020B0604020202020204" pitchFamily="34" charset="0"/>
-              <a:buChar char="•"/>
-            </a:pPr>
-            <a:r>
-              <a:rPr lang="vi-VN" dirty="0"/>
-              <a:t>Hệ thống được sử dụng ở đâu trong tổ chức?</a:t>
             </a:r>
             <a:endParaRPr lang="en-US" dirty="0"/>
           </a:p>
@@ -17840,8 +17615,100 @@
               <a:buChar char="•"/>
             </a:pPr>
             <a:r>
-              <a:rPr lang="vi-VN" dirty="0"/>
-              <a:t>Ai là người bảo trì, quản trị và đảm bảo cho hệ thống hoạt động</a:t>
+              <a:rPr lang="en-US" dirty="0"/>
+              <a:t>Ai </a:t>
+            </a:r>
+            <a:r>
+              <a:rPr lang="en-US" dirty="0" err="1"/>
+              <a:t>sẽ</a:t>
+            </a:r>
+            <a:r>
+              <a:rPr lang="en-US" dirty="0"/>
+              <a:t> </a:t>
+            </a:r>
+            <a:r>
+              <a:rPr lang="en-US" dirty="0" err="1"/>
+              <a:t>cung</a:t>
+            </a:r>
+            <a:r>
+              <a:rPr lang="en-US" dirty="0"/>
+              <a:t> </a:t>
+            </a:r>
+            <a:r>
+              <a:rPr lang="en-US" dirty="0" err="1"/>
+              <a:t>cấp</a:t>
+            </a:r>
+            <a:r>
+              <a:rPr lang="en-US" dirty="0"/>
+              <a:t>, </a:t>
+            </a:r>
+            <a:r>
+              <a:rPr lang="en-US" dirty="0" err="1"/>
+              <a:t>sử</a:t>
+            </a:r>
+            <a:r>
+              <a:rPr lang="en-US" dirty="0"/>
+              <a:t> </a:t>
+            </a:r>
+            <a:r>
+              <a:rPr lang="en-US" dirty="0" err="1"/>
+              <a:t>dụng</a:t>
+            </a:r>
+            <a:r>
+              <a:rPr lang="en-US" dirty="0"/>
+              <a:t>, </a:t>
+            </a:r>
+            <a:r>
+              <a:rPr lang="en-US" dirty="0" err="1"/>
+              <a:t>hoặc</a:t>
+            </a:r>
+            <a:r>
+              <a:rPr lang="en-US" dirty="0"/>
+              <a:t> </a:t>
+            </a:r>
+            <a:r>
+              <a:rPr lang="en-US" dirty="0" err="1"/>
+              <a:t>loại</a:t>
+            </a:r>
+            <a:r>
+              <a:rPr lang="en-US" dirty="0"/>
+              <a:t> </a:t>
+            </a:r>
+            <a:r>
+              <a:rPr lang="en-US" dirty="0" err="1"/>
+              <a:t>bỏ</a:t>
+            </a:r>
+            <a:r>
+              <a:rPr lang="en-US" dirty="0"/>
+              <a:t> </a:t>
+            </a:r>
+            <a:r>
+              <a:rPr lang="en-US" dirty="0" err="1"/>
+              <a:t>thông</a:t>
+            </a:r>
+            <a:r>
+              <a:rPr lang="en-US" dirty="0"/>
+              <a:t> tin </a:t>
+            </a:r>
+            <a:r>
+              <a:rPr lang="en-US" dirty="0" err="1"/>
+              <a:t>trong</a:t>
+            </a:r>
+            <a:r>
+              <a:rPr lang="en-US" dirty="0"/>
+              <a:t> </a:t>
+            </a:r>
+            <a:r>
+              <a:rPr lang="en-US" dirty="0" err="1"/>
+              <a:t>hệ</a:t>
+            </a:r>
+            <a:r>
+              <a:rPr lang="en-US" dirty="0"/>
+              <a:t> </a:t>
+            </a:r>
+            <a:r>
+              <a:rPr lang="en-US" dirty="0" err="1"/>
+              <a:t>thống</a:t>
             </a:r>
             <a:r>
               <a:rPr lang="en-US" dirty="0"/>
@@ -17854,8 +17721,12 @@
               <a:buChar char="•"/>
             </a:pPr>
             <a:r>
+              <a:rPr lang="en-US" dirty="0"/>
+              <a:t>Ai </a:t>
+            </a:r>
+            <a:r>
               <a:rPr lang="en-US" dirty="0" err="1"/>
-              <a:t>Cần</a:t>
+              <a:t>sẽ</a:t>
             </a:r>
             <a:r>
               <a:rPr lang="en-US" dirty="0"/>
@@ -17863,7 +17734,224 @@
             </a:r>
             <a:r>
               <a:rPr lang="en-US" dirty="0" err="1"/>
-              <a:t>xác</a:t>
+              <a:t>sử</a:t>
+            </a:r>
+            <a:r>
+              <a:rPr lang="en-US" dirty="0"/>
+              <a:t> </a:t>
+            </a:r>
+            <a:r>
+              <a:rPr lang="en-US" dirty="0" err="1"/>
+              <a:t>dụng</a:t>
+            </a:r>
+            <a:r>
+              <a:rPr lang="en-US" dirty="0"/>
+              <a:t> </a:t>
+            </a:r>
+            <a:r>
+              <a:rPr lang="en-US" dirty="0" err="1"/>
+              <a:t>các</a:t>
+            </a:r>
+            <a:r>
+              <a:rPr lang="en-US" dirty="0"/>
+              <a:t> </a:t>
+            </a:r>
+            <a:r>
+              <a:rPr lang="en-US" dirty="0" err="1"/>
+              <a:t>chức</a:t>
+            </a:r>
+            <a:r>
+              <a:rPr lang="en-US" dirty="0"/>
+              <a:t> </a:t>
+            </a:r>
+            <a:r>
+              <a:rPr lang="en-US" dirty="0" err="1"/>
+              <a:t>năng</a:t>
+            </a:r>
+            <a:r>
+              <a:rPr lang="en-US" dirty="0"/>
+              <a:t> </a:t>
+            </a:r>
+            <a:r>
+              <a:rPr lang="en-US" dirty="0" err="1"/>
+              <a:t>này</a:t>
+            </a:r>
+            <a:r>
+              <a:rPr lang="en-US" dirty="0"/>
+              <a:t> </a:t>
+            </a:r>
+            <a:r>
+              <a:rPr lang="en-US" dirty="0" err="1"/>
+              <a:t>của</a:t>
+            </a:r>
+            <a:r>
+              <a:rPr lang="en-US" dirty="0"/>
+              <a:t> </a:t>
+            </a:r>
+            <a:r>
+              <a:rPr lang="en-US" dirty="0" err="1"/>
+              <a:t>hệ</a:t>
+            </a:r>
+            <a:r>
+              <a:rPr lang="en-US" dirty="0"/>
+              <a:t> </a:t>
+            </a:r>
+            <a:r>
+              <a:rPr lang="en-US" dirty="0" err="1"/>
+              <a:t>thống</a:t>
+            </a:r>
+            <a:r>
+              <a:rPr lang="en-US" dirty="0"/>
+              <a:t>?</a:t>
+            </a:r>
+          </a:p>
+          <a:p>
+            <a:pPr>
+              <a:buFont typeface="Arial" panose="020B0604020202020204" pitchFamily="34" charset="0"/>
+              <a:buChar char="•"/>
+            </a:pPr>
+            <a:r>
+              <a:rPr lang="en-US" dirty="0"/>
+              <a:t>Ai </a:t>
+            </a:r>
+            <a:r>
+              <a:rPr lang="en-US" dirty="0" err="1"/>
+              <a:t>quan</a:t>
+            </a:r>
+            <a:r>
+              <a:rPr lang="en-US" dirty="0"/>
+              <a:t> </a:t>
+            </a:r>
+            <a:r>
+              <a:rPr lang="en-US" dirty="0" err="1"/>
+              <a:t>tâm</a:t>
+            </a:r>
+            <a:r>
+              <a:rPr lang="en-US" dirty="0"/>
+              <a:t> </a:t>
+            </a:r>
+            <a:r>
+              <a:rPr lang="en-US" dirty="0" err="1"/>
+              <a:t>đến</a:t>
+            </a:r>
+            <a:r>
+              <a:rPr lang="en-US" dirty="0"/>
+              <a:t> </a:t>
+            </a:r>
+            <a:r>
+              <a:rPr lang="en-US" dirty="0" err="1"/>
+              <a:t>các</a:t>
+            </a:r>
+            <a:r>
+              <a:rPr lang="en-US" dirty="0"/>
+              <a:t> </a:t>
+            </a:r>
+            <a:r>
+              <a:rPr lang="en-US" dirty="0" err="1"/>
+              <a:t>yêu</a:t>
+            </a:r>
+            <a:r>
+              <a:rPr lang="en-US" dirty="0"/>
+              <a:t> </a:t>
+            </a:r>
+            <a:r>
+              <a:rPr lang="en-US" dirty="0" err="1"/>
+              <a:t>cầu</a:t>
+            </a:r>
+            <a:r>
+              <a:rPr lang="en-US" dirty="0"/>
+              <a:t> </a:t>
+            </a:r>
+            <a:r>
+              <a:rPr lang="en-US" dirty="0" err="1"/>
+              <a:t>cụ</a:t>
+            </a:r>
+            <a:r>
+              <a:rPr lang="en-US" dirty="0"/>
+              <a:t> </a:t>
+            </a:r>
+            <a:r>
+              <a:rPr lang="en-US" dirty="0" err="1"/>
+              <a:t>thể</a:t>
+            </a:r>
+            <a:r>
+              <a:rPr lang="en-US" dirty="0"/>
+              <a:t> </a:t>
+            </a:r>
+            <a:r>
+              <a:rPr lang="en-US" dirty="0" err="1"/>
+              <a:t>của</a:t>
+            </a:r>
+            <a:r>
+              <a:rPr lang="en-US" dirty="0"/>
+              <a:t> </a:t>
+            </a:r>
+            <a:r>
+              <a:rPr lang="en-US" dirty="0" err="1"/>
+              <a:t>hệ</a:t>
+            </a:r>
+            <a:r>
+              <a:rPr lang="en-US" dirty="0"/>
+              <a:t> </a:t>
+            </a:r>
+            <a:r>
+              <a:rPr lang="en-US" dirty="0" err="1"/>
+              <a:t>thống</a:t>
+            </a:r>
+            <a:r>
+              <a:rPr lang="en-US" dirty="0"/>
+              <a:t>?</a:t>
+            </a:r>
+          </a:p>
+          <a:p>
+            <a:pPr>
+              <a:buFont typeface="Arial" panose="020B0604020202020204" pitchFamily="34" charset="0"/>
+              <a:buChar char="•"/>
+            </a:pPr>
+            <a:r>
+              <a:rPr lang="vi-VN" dirty="0"/>
+              <a:t>Hệ thống được sử dụng ở đâu trong tổ chức?</a:t>
+            </a:r>
+            <a:endParaRPr lang="en-US" dirty="0"/>
+          </a:p>
+          <a:p>
+            <a:pPr>
+              <a:buFont typeface="Arial" panose="020B0604020202020204" pitchFamily="34" charset="0"/>
+              <a:buChar char="•"/>
+            </a:pPr>
+            <a:r>
+              <a:rPr lang="vi-VN" dirty="0"/>
+              <a:t>Ai là người bảo trì, quản trị</a:t>
+            </a:r>
+            <a:r>
+              <a:rPr lang="en-US" dirty="0"/>
+              <a:t> </a:t>
+            </a:r>
+            <a:r>
+              <a:rPr lang="en-US" dirty="0" err="1"/>
+              <a:t>hệ</a:t>
+            </a:r>
+            <a:r>
+              <a:rPr lang="en-US" dirty="0"/>
+              <a:t> </a:t>
+            </a:r>
+            <a:r>
+              <a:rPr lang="en-US" dirty="0" err="1"/>
+              <a:t>thống</a:t>
+            </a:r>
+            <a:r>
+              <a:rPr lang="en-US" dirty="0"/>
+              <a:t>?</a:t>
+            </a:r>
+          </a:p>
+          <a:p>
+            <a:pPr>
+              <a:buFont typeface="Arial" panose="020B0604020202020204" pitchFamily="34" charset="0"/>
+              <a:buChar char="•"/>
+            </a:pPr>
+            <a:r>
+              <a:rPr lang="en-US" dirty="0" err="1"/>
+              <a:t>Xác</a:t>
             </a:r>
             <a:r>
               <a:rPr lang="en-US" dirty="0"/>
@@ -17879,7 +17967,67 @@
             </a:r>
             <a:r>
               <a:rPr lang="en-US" dirty="0" err="1"/>
-              <a:t>rõ</a:t>
+              <a:t>các</a:t>
+            </a:r>
+            <a:r>
+              <a:rPr lang="en-US" dirty="0"/>
+              <a:t> </a:t>
+            </a:r>
+            <a:r>
+              <a:rPr lang="en-US" dirty="0" err="1"/>
+              <a:t>hệ</a:t>
+            </a:r>
+            <a:r>
+              <a:rPr lang="en-US" dirty="0"/>
+              <a:t> </a:t>
+            </a:r>
+            <a:r>
+              <a:rPr lang="en-US" dirty="0" err="1"/>
+              <a:t>thống</a:t>
+            </a:r>
+            <a:r>
+              <a:rPr lang="en-US" dirty="0"/>
+              <a:t> </a:t>
+            </a:r>
+            <a:r>
+              <a:rPr lang="en-US" dirty="0" err="1"/>
+              <a:t>khác</a:t>
+            </a:r>
+            <a:r>
+              <a:rPr lang="en-US" dirty="0"/>
+              <a:t> </a:t>
+            </a:r>
+            <a:r>
+              <a:rPr lang="en-US" dirty="0" err="1"/>
+              <a:t>cần</a:t>
+            </a:r>
+            <a:r>
+              <a:rPr lang="en-US" dirty="0"/>
+              <a:t> t</a:t>
+            </a:r>
+            <a:r>
+              <a:rPr lang="vi-VN" dirty="0"/>
+              <a:t>ư</a:t>
+            </a:r>
+            <a:r>
+              <a:rPr lang="en-US" dirty="0" err="1"/>
+              <a:t>ơng</a:t>
+            </a:r>
+            <a:r>
+              <a:rPr lang="en-US" dirty="0"/>
+              <a:t> </a:t>
+            </a:r>
+            <a:r>
+              <a:rPr lang="en-US" dirty="0" err="1"/>
+              <a:t>tác</a:t>
+            </a:r>
+            <a:r>
+              <a:rPr lang="en-US" dirty="0"/>
+              <a:t> </a:t>
+            </a:r>
+            <a:r>
+              <a:rPr lang="en-US" dirty="0" err="1"/>
+              <a:t>và</a:t>
             </a:r>
             <a:r>
               <a:rPr lang="en-US" dirty="0"/>
@@ -17927,7 +18075,7 @@
             </a:r>
             <a:r>
               <a:rPr lang="en-US" dirty="0" err="1"/>
-              <a:t>yêu</a:t>
+              <a:t>mới</a:t>
             </a:r>
             <a:r>
               <a:rPr lang="en-US" dirty="0"/>
@@ -17935,7 +18083,7 @@
             </a:r>
             <a:r>
               <a:rPr lang="en-US" dirty="0" err="1"/>
-              <a:t>cầu</a:t>
+              <a:t>và</a:t>
             </a:r>
             <a:r>
               <a:rPr lang="en-US" dirty="0"/>
@@ -17943,23 +18091,7 @@
             </a:r>
             <a:r>
               <a:rPr lang="en-US" dirty="0" err="1"/>
-              <a:t>xây</a:t>
-            </a:r>
-            <a:r>
-              <a:rPr lang="en-US" dirty="0"/>
-              <a:t> </a:t>
-            </a:r>
-            <a:r>
-              <a:rPr lang="en-US" dirty="0" err="1"/>
-              <a:t>dựng</a:t>
-            </a:r>
-            <a:r>
-              <a:rPr lang="en-US" dirty="0"/>
-              <a:t> </a:t>
-            </a:r>
-            <a:r>
-              <a:rPr lang="en-US" dirty="0" err="1"/>
-              <a:t>với</a:t>
+              <a:t>các</a:t>
             </a:r>
             <a:r>
               <a:rPr lang="en-US" dirty="0"/>
@@ -17983,11 +18115,19 @@
             </a:r>
             <a:r>
               <a:rPr lang="en-US" dirty="0" err="1"/>
-              <a:t>khác</a:t>
+              <a:t>hiện</a:t>
             </a:r>
             <a:r>
               <a:rPr lang="en-US" dirty="0"/>
-              <a:t>, … </a:t>
+              <a:t> </a:t>
+            </a:r>
+            <a:r>
+              <a:rPr lang="en-US" dirty="0" err="1"/>
+              <a:t>có</a:t>
+            </a:r>
+            <a:r>
+              <a:rPr lang="en-US" dirty="0"/>
+              <a:t> …</a:t>
             </a:r>
           </a:p>
           <a:p>
@@ -18152,23 +18292,17 @@
             </a:r>
           </a:p>
           <a:p>
-            <a:pPr marL="114300" indent="0">
-              <a:buNone/>
-            </a:pPr>
+            <a:r>
+              <a:rPr lang="en-US" dirty="0"/>
+              <a:t>X</a:t>
+            </a:r>
             <a:r>
               <a:rPr lang="vi-VN" dirty="0"/>
-              <a:t>	Hành động của tác nhân, hành động của hệ thống, các hành động bên ngoài, các sự kiện có thể được gây ra</a:t>
+              <a:t>ác định ca sử dụng của hệ thống dựa trên các chức năng cần thiết, yêu cầu truy cập và lưu trữ thông tin, các thông báo cần thiết, các sự kiện bên ngoài, và việc đơn giản hóa công việc cho tác nhân.</a:t>
             </a:r>
             <a:endParaRPr lang="en-US" dirty="0"/>
           </a:p>
           <a:p>
-            <a:pPr marL="114300" indent="0">
-              <a:buNone/>
-            </a:pPr>
-            <a:r>
-              <a:rPr lang="en-US" dirty="0"/>
-              <a:t>	</a:t>
-            </a:r>
             <a:r>
               <a:rPr lang="en-US" dirty="0" err="1"/>
               <a:t>Lưu</a:t>
@@ -18416,7 +18550,9 @@
         </p:nvSpPr>
         <p:spPr/>
         <p:txBody>
-          <a:bodyPr/>
+          <a:bodyPr>
+            <a:normAutofit fontScale="92500" lnSpcReduction="10000"/>
+          </a:bodyPr>
           <a:lstStyle/>
           <a:p>
             <a:pPr>
@@ -18517,6 +18653,243 @@
             </a:r>
             <a:r>
               <a:rPr lang="en-US" b="1" dirty="0"/>
+              <a:t>:</a:t>
+            </a:r>
+          </a:p>
+          <a:p>
+            <a:r>
+              <a:rPr lang="en-US" dirty="0" err="1"/>
+              <a:t>Các</a:t>
+            </a:r>
+            <a:r>
+              <a:rPr lang="en-US" dirty="0"/>
+              <a:t> </a:t>
+            </a:r>
+            <a:r>
+              <a:rPr lang="en-US" dirty="0" err="1"/>
+              <a:t>dạng</a:t>
+            </a:r>
+            <a:r>
+              <a:rPr lang="en-US" dirty="0"/>
+              <a:t> </a:t>
+            </a:r>
+            <a:r>
+              <a:rPr lang="en-US" dirty="0" err="1"/>
+              <a:t>quan</a:t>
+            </a:r>
+            <a:r>
+              <a:rPr lang="en-US" dirty="0"/>
+              <a:t> </a:t>
+            </a:r>
+            <a:r>
+              <a:rPr lang="en-US" dirty="0" err="1"/>
+              <a:t>hệ</a:t>
+            </a:r>
+            <a:r>
+              <a:rPr lang="en-US" dirty="0"/>
+              <a:t> </a:t>
+            </a:r>
+            <a:r>
+              <a:rPr lang="en-US" dirty="0" err="1"/>
+              <a:t>trong</a:t>
+            </a:r>
+            <a:r>
+              <a:rPr lang="en-US" dirty="0"/>
+              <a:t> </a:t>
+            </a:r>
+            <a:r>
+              <a:rPr lang="en-US" dirty="0" err="1"/>
+              <a:t>biểu</a:t>
+            </a:r>
+            <a:r>
+              <a:rPr lang="en-US" dirty="0"/>
+              <a:t> </a:t>
+            </a:r>
+            <a:r>
+              <a:rPr lang="en-US" dirty="0" err="1"/>
+              <a:t>đồ</a:t>
+            </a:r>
+            <a:r>
+              <a:rPr lang="en-US" dirty="0"/>
+              <a:t> ca </a:t>
+            </a:r>
+            <a:r>
+              <a:rPr lang="en-US" dirty="0" err="1"/>
+              <a:t>sử</a:t>
+            </a:r>
+            <a:r>
+              <a:rPr lang="en-US" dirty="0"/>
+              <a:t> </a:t>
+            </a:r>
+            <a:r>
+              <a:rPr lang="en-US" dirty="0" err="1"/>
+              <a:t>dụng</a:t>
+            </a:r>
+            <a:r>
+              <a:rPr lang="en-US" dirty="0"/>
+              <a:t>:</a:t>
+            </a:r>
+          </a:p>
+          <a:p>
+            <a:pPr marL="114300" indent="0">
+              <a:buNone/>
+            </a:pPr>
+            <a:r>
+              <a:rPr lang="en-US" dirty="0"/>
+              <a:t>	+ Quan </a:t>
+            </a:r>
+            <a:r>
+              <a:rPr lang="en-US" dirty="0" err="1"/>
+              <a:t>hệ</a:t>
+            </a:r>
+            <a:r>
+              <a:rPr lang="en-US" dirty="0"/>
+              <a:t> </a:t>
+            </a:r>
+            <a:r>
+              <a:rPr lang="en-US" dirty="0" err="1"/>
+              <a:t>kết</a:t>
+            </a:r>
+            <a:r>
+              <a:rPr lang="en-US" dirty="0"/>
+              <a:t> </a:t>
+            </a:r>
+            <a:r>
+              <a:rPr lang="en-US" dirty="0" err="1"/>
+              <a:t>hợp</a:t>
+            </a:r>
+            <a:endParaRPr lang="en-US" dirty="0"/>
+          </a:p>
+          <a:p>
+            <a:pPr marL="114300" indent="0">
+              <a:buNone/>
+            </a:pPr>
+            <a:r>
+              <a:rPr lang="en-US" dirty="0"/>
+              <a:t>	+ Quan </a:t>
+            </a:r>
+            <a:r>
+              <a:rPr lang="en-US" dirty="0" err="1"/>
+              <a:t>hệ</a:t>
+            </a:r>
+            <a:r>
+              <a:rPr lang="en-US" dirty="0"/>
+              <a:t> &lt;&lt;include&gt;&gt;</a:t>
+            </a:r>
+          </a:p>
+          <a:p>
+            <a:pPr marL="114300" indent="0">
+              <a:buNone/>
+            </a:pPr>
+            <a:r>
+              <a:rPr lang="en-US" dirty="0"/>
+              <a:t>	+ Quan </a:t>
+            </a:r>
+            <a:r>
+              <a:rPr lang="en-US" dirty="0" err="1"/>
+              <a:t>hệ</a:t>
+            </a:r>
+            <a:r>
+              <a:rPr lang="en-US" dirty="0"/>
+              <a:t> </a:t>
+            </a:r>
+            <a:r>
+              <a:rPr lang="en-US" dirty="0" err="1"/>
+              <a:t>mở</a:t>
+            </a:r>
+            <a:r>
+              <a:rPr lang="en-US" dirty="0"/>
+              <a:t> </a:t>
+            </a:r>
+            <a:r>
+              <a:rPr lang="en-US" dirty="0" err="1"/>
+              <a:t>rộng</a:t>
+            </a:r>
+            <a:r>
+              <a:rPr lang="en-US" dirty="0"/>
+              <a:t> &lt;&lt;extend&gt;&gt;</a:t>
+            </a:r>
+          </a:p>
+          <a:p>
+            <a:pPr marL="114300" indent="0">
+              <a:buNone/>
+            </a:pPr>
+            <a:r>
+              <a:rPr lang="en-US" dirty="0"/>
+              <a:t>	+ Quan </a:t>
+            </a:r>
+            <a:r>
+              <a:rPr lang="en-US" dirty="0" err="1"/>
+              <a:t>hệ</a:t>
+            </a:r>
+            <a:r>
+              <a:rPr lang="en-US" dirty="0"/>
+              <a:t> </a:t>
+            </a:r>
+            <a:r>
+              <a:rPr lang="en-US" dirty="0" err="1"/>
+              <a:t>kế</a:t>
+            </a:r>
+            <a:r>
+              <a:rPr lang="en-US" dirty="0"/>
+              <a:t> </a:t>
+            </a:r>
+            <a:r>
+              <a:rPr lang="en-US" dirty="0" err="1"/>
+              <a:t>thừa</a:t>
+            </a:r>
+            <a:r>
+              <a:rPr lang="en-US" dirty="0"/>
+              <a:t> generalization</a:t>
+            </a:r>
+          </a:p>
+          <a:p>
+            <a:r>
+              <a:rPr lang="en-US" dirty="0" err="1"/>
+              <a:t>Nguyên</a:t>
+            </a:r>
+            <a:r>
+              <a:rPr lang="en-US" dirty="0"/>
+              <a:t> </a:t>
+            </a:r>
+            <a:r>
+              <a:rPr lang="en-US" dirty="0" err="1"/>
+              <a:t>tắc</a:t>
+            </a:r>
+            <a:r>
+              <a:rPr lang="en-US" dirty="0"/>
+              <a:t> </a:t>
+            </a:r>
+            <a:r>
+              <a:rPr lang="en-US" dirty="0" err="1"/>
+              <a:t>phân</a:t>
+            </a:r>
+            <a:r>
+              <a:rPr lang="en-US" dirty="0"/>
+              <a:t> </a:t>
+            </a:r>
+            <a:r>
+              <a:rPr lang="en-US" dirty="0" err="1"/>
+              <a:t>rã</a:t>
+            </a:r>
+            <a:r>
+              <a:rPr lang="en-US" dirty="0"/>
+              <a:t> </a:t>
+            </a:r>
+            <a:r>
+              <a:rPr lang="en-US" dirty="0" err="1"/>
+              <a:t>biểu</a:t>
+            </a:r>
+            <a:r>
+              <a:rPr lang="en-US" dirty="0"/>
+              <a:t> </a:t>
+            </a:r>
+            <a:r>
+              <a:rPr lang="en-US" dirty="0" err="1"/>
+              <a:t>đồ</a:t>
+            </a:r>
+            <a:r>
+              <a:rPr lang="en-US" dirty="0"/>
               <a:t>:</a:t>
             </a:r>
           </a:p>
@@ -18892,7 +19265,7 @@
         <p:spPr/>
         <p:txBody>
           <a:bodyPr>
-            <a:normAutofit/>
+            <a:normAutofit lnSpcReduction="10000"/>
           </a:bodyPr>
           <a:lstStyle/>
           <a:p>
@@ -19104,7 +19477,95 @@
             </a:r>
             <a:r>
               <a:rPr lang="vi-VN" dirty="0"/>
-              <a:t>kiện. </a:t>
+              <a:t>kiện</a:t>
+            </a:r>
+            <a:r>
+              <a:rPr lang="en-US" dirty="0"/>
+              <a:t> (</a:t>
+            </a:r>
+            <a:r>
+              <a:rPr lang="en-US" dirty="0" err="1"/>
+              <a:t>luồng</a:t>
+            </a:r>
+            <a:r>
+              <a:rPr lang="en-US" dirty="0"/>
+              <a:t> </a:t>
+            </a:r>
+            <a:r>
+              <a:rPr lang="en-US" dirty="0" err="1"/>
+              <a:t>sự</a:t>
+            </a:r>
+            <a:r>
+              <a:rPr lang="en-US" dirty="0"/>
+              <a:t> </a:t>
+            </a:r>
+            <a:r>
+              <a:rPr lang="en-US" dirty="0" err="1"/>
+              <a:t>kiện</a:t>
+            </a:r>
+            <a:r>
+              <a:rPr lang="en-US" dirty="0"/>
+              <a:t> </a:t>
+            </a:r>
+            <a:r>
+              <a:rPr lang="en-US" dirty="0" err="1"/>
+              <a:t>chính</a:t>
+            </a:r>
+            <a:r>
+              <a:rPr lang="en-US" dirty="0"/>
+              <a:t> </a:t>
+            </a:r>
+            <a:r>
+              <a:rPr lang="en-US" dirty="0" err="1"/>
+              <a:t>và</a:t>
+            </a:r>
+            <a:r>
+              <a:rPr lang="en-US" dirty="0"/>
+              <a:t> </a:t>
+            </a:r>
+            <a:r>
+              <a:rPr lang="en-US" dirty="0" err="1"/>
+              <a:t>luồng</a:t>
+            </a:r>
+            <a:r>
+              <a:rPr lang="en-US" dirty="0"/>
+              <a:t> </a:t>
+            </a:r>
+            <a:r>
+              <a:rPr lang="en-US" dirty="0" err="1"/>
+              <a:t>sự</a:t>
+            </a:r>
+            <a:r>
+              <a:rPr lang="en-US" dirty="0"/>
+              <a:t> </a:t>
+            </a:r>
+            <a:r>
+              <a:rPr lang="en-US" dirty="0" err="1"/>
+              <a:t>kiện</a:t>
+            </a:r>
+            <a:r>
+              <a:rPr lang="en-US" dirty="0"/>
+              <a:t> </a:t>
+            </a:r>
+            <a:r>
+              <a:rPr lang="en-US" dirty="0" err="1"/>
+              <a:t>thay</a:t>
+            </a:r>
+            <a:r>
+              <a:rPr lang="en-US" dirty="0"/>
+              <a:t> </a:t>
+            </a:r>
+            <a:r>
+              <a:rPr lang="en-US" dirty="0" err="1"/>
+              <a:t>thế</a:t>
+            </a:r>
+            <a:r>
+              <a:rPr lang="en-US" dirty="0"/>
+              <a:t>)</a:t>
+            </a:r>
+            <a:r>
+              <a:rPr lang="vi-VN" dirty="0"/>
+              <a:t>. </a:t>
             </a:r>
             <a:endParaRPr lang="en-US" dirty="0"/>
           </a:p>
@@ -19247,7 +19708,9 @@
         </p:nvSpPr>
         <p:spPr/>
         <p:txBody>
-          <a:bodyPr/>
+          <a:bodyPr>
+            <a:normAutofit lnSpcReduction="10000"/>
+          </a:bodyPr>
           <a:lstStyle/>
           <a:p>
             <a:pPr>
@@ -19277,25 +19740,777 @@
             <a:endParaRPr lang="en-US" b="1" dirty="0"/>
           </a:p>
           <a:p>
-            <a:pPr marL="114300" indent="0">
-              <a:buNone/>
+            <a:pPr>
+              <a:buFont typeface="Arial" panose="020B0604020202020204" pitchFamily="34" charset="0"/>
+              <a:buChar char="•"/>
             </a:pPr>
             <a:r>
-              <a:rPr lang="en-US" b="1" dirty="0"/>
-              <a:t>	</a:t>
+              <a:rPr lang="en-US" sz="2400" dirty="0" err="1"/>
+              <a:t>Mục</a:t>
+            </a:r>
+            <a:r>
+              <a:rPr lang="en-US" sz="2400" dirty="0"/>
+              <a:t> </a:t>
+            </a:r>
+            <a:r>
+              <a:rPr lang="en-US" sz="2400" dirty="0" err="1"/>
+              <a:t>đích</a:t>
+            </a:r>
+            <a:r>
+              <a:rPr lang="en-US" sz="2400" dirty="0"/>
+              <a:t>: </a:t>
+            </a:r>
+            <a:r>
+              <a:rPr lang="en-US" sz="2400" dirty="0" err="1"/>
+              <a:t>đảm</a:t>
+            </a:r>
+            <a:r>
+              <a:rPr lang="en-US" sz="2400" dirty="0"/>
+              <a:t> </a:t>
+            </a:r>
+            <a:r>
+              <a:rPr lang="en-US" sz="2400" dirty="0" err="1"/>
+              <a:t>bảo</a:t>
+            </a:r>
+            <a:r>
+              <a:rPr lang="en-US" sz="2400" dirty="0"/>
+              <a:t> </a:t>
+            </a:r>
+            <a:r>
+              <a:rPr lang="en-US" sz="2400" dirty="0" err="1"/>
+              <a:t>biểu</a:t>
+            </a:r>
+            <a:r>
+              <a:rPr lang="en-US" sz="2400" dirty="0"/>
+              <a:t> </a:t>
+            </a:r>
+            <a:r>
+              <a:rPr lang="en-US" sz="2400" dirty="0" err="1"/>
+              <a:t>đồ</a:t>
+            </a:r>
+            <a:r>
+              <a:rPr lang="en-US" sz="2400" dirty="0"/>
+              <a:t> ca </a:t>
+            </a:r>
+            <a:r>
+              <a:rPr lang="en-US" sz="2400" dirty="0" err="1"/>
+              <a:t>sử</a:t>
+            </a:r>
+            <a:r>
+              <a:rPr lang="en-US" sz="2400" dirty="0"/>
+              <a:t> </a:t>
+            </a:r>
+            <a:r>
+              <a:rPr lang="en-US" sz="2400" dirty="0" err="1"/>
+              <a:t>dụng</a:t>
+            </a:r>
+            <a:r>
+              <a:rPr lang="en-US" sz="2400" dirty="0"/>
+              <a:t> </a:t>
+            </a:r>
+            <a:r>
+              <a:rPr lang="en-US" sz="2400" dirty="0" err="1"/>
+              <a:t>và</a:t>
+            </a:r>
+            <a:r>
+              <a:rPr lang="en-US" sz="2400" dirty="0"/>
+              <a:t> </a:t>
+            </a:r>
+            <a:r>
+              <a:rPr lang="en-US" sz="2400" dirty="0" err="1"/>
+              <a:t>các</a:t>
+            </a:r>
+            <a:r>
+              <a:rPr lang="en-US" sz="2400" dirty="0"/>
+              <a:t> </a:t>
+            </a:r>
+            <a:r>
+              <a:rPr lang="en-US" sz="2400" dirty="0" err="1"/>
+              <a:t>tài</a:t>
+            </a:r>
+            <a:r>
+              <a:rPr lang="en-US" sz="2400" dirty="0"/>
+              <a:t> </a:t>
+            </a:r>
+            <a:r>
+              <a:rPr lang="en-US" sz="2400" dirty="0" err="1"/>
+              <a:t>liệu</a:t>
+            </a:r>
+            <a:r>
+              <a:rPr lang="en-US" sz="2400" dirty="0"/>
+              <a:t> </a:t>
+            </a:r>
+            <a:r>
+              <a:rPr lang="en-US" sz="2400" dirty="0" err="1"/>
+              <a:t>liên</a:t>
+            </a:r>
+            <a:r>
+              <a:rPr lang="en-US" sz="2400" dirty="0"/>
+              <a:t> </a:t>
+            </a:r>
+            <a:r>
+              <a:rPr lang="en-US" sz="2400" dirty="0" err="1"/>
+              <a:t>quan</a:t>
+            </a:r>
+            <a:r>
+              <a:rPr lang="en-US" sz="2400" dirty="0"/>
+              <a:t> </a:t>
+            </a:r>
+            <a:r>
+              <a:rPr lang="en-US" sz="2400" dirty="0" err="1"/>
+              <a:t>đều</a:t>
+            </a:r>
+            <a:r>
+              <a:rPr lang="en-US" sz="2400" dirty="0"/>
+              <a:t> </a:t>
+            </a:r>
+            <a:r>
+              <a:rPr lang="en-US" sz="2400" dirty="0" err="1"/>
+              <a:t>chính</a:t>
+            </a:r>
+            <a:r>
+              <a:rPr lang="en-US" sz="2400" dirty="0"/>
+              <a:t> </a:t>
+            </a:r>
+            <a:r>
+              <a:rPr lang="en-US" sz="2400" dirty="0" err="1"/>
+              <a:t>xác</a:t>
+            </a:r>
+            <a:r>
+              <a:rPr lang="en-US" sz="2400" dirty="0"/>
+              <a:t>, </a:t>
+            </a:r>
+            <a:r>
+              <a:rPr lang="en-US" sz="2400" dirty="0" err="1"/>
+              <a:t>hoàn</a:t>
+            </a:r>
+            <a:r>
+              <a:rPr lang="en-US" sz="2400" dirty="0"/>
+              <a:t> </a:t>
+            </a:r>
+            <a:r>
+              <a:rPr lang="en-US" sz="2400" dirty="0" err="1"/>
+              <a:t>chỉnh</a:t>
+            </a:r>
+            <a:endParaRPr lang="en-US" sz="2400" dirty="0"/>
+          </a:p>
+          <a:p>
+            <a:pPr>
+              <a:buFont typeface="Arial" panose="020B0604020202020204" pitchFamily="34" charset="0"/>
+              <a:buChar char="•"/>
+            </a:pPr>
+            <a:r>
+              <a:rPr lang="en-US" sz="2400" dirty="0" err="1"/>
+              <a:t>Quy</a:t>
+            </a:r>
+            <a:r>
+              <a:rPr lang="en-US" sz="2400" dirty="0"/>
+              <a:t> </a:t>
+            </a:r>
+            <a:r>
+              <a:rPr lang="en-US" sz="2400" dirty="0" err="1"/>
+              <a:t>trình</a:t>
+            </a:r>
+            <a:r>
+              <a:rPr lang="en-US" sz="2400" dirty="0"/>
+              <a:t>:</a:t>
+            </a:r>
+          </a:p>
+          <a:p>
+            <a:pPr marL="571500" lvl="1" indent="0">
+              <a:buNone/>
+            </a:pPr>
+            <a:r>
+              <a:rPr lang="en-US" dirty="0"/>
+              <a:t>+ </a:t>
+            </a:r>
+            <a:r>
+              <a:rPr lang="en-US" dirty="0" err="1"/>
+              <a:t>Kiểm</a:t>
+            </a:r>
+            <a:r>
+              <a:rPr lang="en-US" dirty="0"/>
+              <a:t> </a:t>
+            </a:r>
+            <a:r>
+              <a:rPr lang="en-US" dirty="0" err="1"/>
+              <a:t>tra</a:t>
+            </a:r>
+            <a:r>
+              <a:rPr lang="en-US" dirty="0"/>
+              <a:t> </a:t>
+            </a:r>
+            <a:r>
+              <a:rPr lang="en-US" dirty="0" err="1"/>
+              <a:t>lại</a:t>
+            </a:r>
+            <a:r>
+              <a:rPr lang="en-US" dirty="0"/>
+              <a:t> </a:t>
+            </a:r>
+            <a:r>
+              <a:rPr lang="en-US" dirty="0" err="1"/>
+              <a:t>toàn</a:t>
+            </a:r>
+            <a:r>
+              <a:rPr lang="en-US" dirty="0"/>
+              <a:t> </a:t>
+            </a:r>
+            <a:r>
+              <a:rPr lang="en-US" dirty="0" err="1"/>
+              <a:t>bộ</a:t>
+            </a:r>
+            <a:r>
+              <a:rPr lang="en-US" dirty="0"/>
+              <a:t> </a:t>
+            </a:r>
+            <a:r>
+              <a:rPr lang="en-US" dirty="0" err="1"/>
+              <a:t>biểu</a:t>
+            </a:r>
+            <a:r>
+              <a:rPr lang="en-US" dirty="0"/>
+              <a:t> </a:t>
+            </a:r>
+            <a:r>
+              <a:rPr lang="en-US" dirty="0" err="1"/>
+              <a:t>đồ</a:t>
+            </a:r>
+            <a:r>
+              <a:rPr lang="en-US" dirty="0"/>
+              <a:t> ca </a:t>
+            </a:r>
+            <a:r>
+              <a:rPr lang="en-US" dirty="0" err="1"/>
+              <a:t>sử</a:t>
+            </a:r>
+            <a:r>
+              <a:rPr lang="en-US" dirty="0"/>
+              <a:t> </a:t>
+            </a:r>
+            <a:r>
+              <a:rPr lang="en-US" dirty="0" err="1"/>
+              <a:t>dụng</a:t>
+            </a:r>
+            <a:endParaRPr lang="en-US" dirty="0"/>
+          </a:p>
+          <a:p>
+            <a:pPr marL="571500" lvl="1" indent="0">
+              <a:buNone/>
+            </a:pPr>
+            <a:r>
+              <a:rPr lang="en-US" dirty="0"/>
+              <a:t>+ </a:t>
+            </a:r>
+            <a:r>
+              <a:rPr lang="en-US" dirty="0" err="1"/>
+              <a:t>Bổ</a:t>
+            </a:r>
+            <a:r>
+              <a:rPr lang="en-US" dirty="0"/>
+              <a:t> sung </a:t>
+            </a:r>
+            <a:r>
+              <a:rPr lang="en-US" dirty="0" err="1"/>
+              <a:t>hoặc</a:t>
+            </a:r>
+            <a:r>
+              <a:rPr lang="en-US" dirty="0"/>
+              <a:t> </a:t>
+            </a:r>
+            <a:r>
+              <a:rPr lang="en-US" dirty="0" err="1"/>
+              <a:t>thay</a:t>
+            </a:r>
+            <a:r>
+              <a:rPr lang="en-US" dirty="0"/>
+              <a:t> </a:t>
+            </a:r>
+            <a:r>
+              <a:rPr lang="en-US" dirty="0" err="1"/>
+              <a:t>đổi</a:t>
+            </a:r>
+            <a:r>
+              <a:rPr lang="en-US" dirty="0"/>
+              <a:t> </a:t>
+            </a:r>
+            <a:r>
+              <a:rPr lang="en-US" dirty="0" err="1"/>
+              <a:t>thông</a:t>
+            </a:r>
+            <a:r>
+              <a:rPr lang="en-US" dirty="0"/>
+              <a:t> tin </a:t>
+            </a:r>
+            <a:r>
+              <a:rPr lang="en-US" dirty="0" err="1"/>
+              <a:t>ch</a:t>
             </a:r>
             <a:r>
               <a:rPr lang="vi-VN" dirty="0"/>
-              <a:t>Bước này thực hiện kiểm tra lại toàn bộ biểu đồ ca sử dụng, bổ sung</a:t>
+              <a:t>ư</a:t>
             </a:r>
             <a:r>
               <a:rPr lang="en-US" dirty="0"/>
-              <a:t> </a:t>
+              <a:t>a </a:t>
+            </a:r>
+            <a:r>
+              <a:rPr lang="en-US" dirty="0" err="1"/>
+              <a:t>phù</a:t>
+            </a:r>
+            <a:r>
+              <a:rPr lang="en-US" dirty="0"/>
+              <a:t> </a:t>
+            </a:r>
+            <a:r>
+              <a:rPr lang="en-US" dirty="0" err="1"/>
+              <a:t>hợp</a:t>
+            </a:r>
+            <a:endParaRPr lang="en-US" dirty="0"/>
+          </a:p>
+          <a:p>
+            <a:pPr marL="571500" lvl="1" indent="0">
+              <a:buNone/>
+            </a:pPr>
+            <a:r>
+              <a:rPr lang="en-US" dirty="0"/>
+              <a:t>+ </a:t>
+            </a:r>
+            <a:r>
+              <a:rPr lang="en-US" dirty="0" err="1"/>
+              <a:t>Chuyển</a:t>
+            </a:r>
+            <a:r>
+              <a:rPr lang="en-US" dirty="0"/>
+              <a:t> </a:t>
+            </a:r>
+            <a:r>
+              <a:rPr lang="en-US" dirty="0" err="1"/>
+              <a:t>tài</a:t>
+            </a:r>
+            <a:r>
+              <a:rPr lang="en-US" dirty="0"/>
+              <a:t> </a:t>
+            </a:r>
+            <a:r>
+              <a:rPr lang="en-US" dirty="0" err="1"/>
+              <a:t>liệu</a:t>
+            </a:r>
+            <a:r>
+              <a:rPr lang="en-US" dirty="0"/>
+              <a:t> </a:t>
+            </a:r>
+            <a:r>
+              <a:rPr lang="en-US" dirty="0" err="1"/>
+              <a:t>cho</a:t>
+            </a:r>
+            <a:r>
+              <a:rPr lang="en-US" dirty="0"/>
+              <a:t> </a:t>
+            </a:r>
+            <a:r>
+              <a:rPr lang="en-US" dirty="0" err="1"/>
+              <a:t>khách</a:t>
+            </a:r>
+            <a:r>
+              <a:rPr lang="en-US" dirty="0"/>
+              <a:t> </a:t>
+            </a:r>
+            <a:r>
+              <a:rPr lang="en-US" dirty="0" err="1"/>
+              <a:t>hàng</a:t>
+            </a:r>
+            <a:r>
+              <a:rPr lang="en-US" dirty="0"/>
+              <a:t> (</a:t>
+            </a:r>
+            <a:r>
+              <a:rPr lang="en-US" dirty="0" err="1"/>
+              <a:t>biểu</a:t>
+            </a:r>
+            <a:r>
+              <a:rPr lang="en-US" dirty="0"/>
+              <a:t> </a:t>
+            </a:r>
+            <a:r>
+              <a:rPr lang="en-US" dirty="0" err="1"/>
+              <a:t>đồ</a:t>
+            </a:r>
+            <a:r>
+              <a:rPr lang="en-US" dirty="0"/>
+              <a:t> ca </a:t>
+            </a:r>
+            <a:r>
+              <a:rPr lang="en-US" dirty="0" err="1"/>
+              <a:t>sử</a:t>
+            </a:r>
+            <a:r>
+              <a:rPr lang="en-US" dirty="0"/>
+              <a:t> </a:t>
+            </a:r>
+            <a:r>
+              <a:rPr lang="en-US" dirty="0" err="1"/>
+              <a:t>dụng</a:t>
+            </a:r>
+            <a:r>
+              <a:rPr lang="en-US" dirty="0"/>
+              <a:t>, </a:t>
+            </a:r>
+            <a:r>
+              <a:rPr lang="en-US" dirty="0" err="1"/>
+              <a:t>các</a:t>
+            </a:r>
+            <a:r>
+              <a:rPr lang="en-US" dirty="0"/>
+              <a:t> scenario, </a:t>
+            </a:r>
+            <a:r>
+              <a:rPr lang="en-US" dirty="0" err="1"/>
+              <a:t>tài</a:t>
+            </a:r>
+            <a:r>
+              <a:rPr lang="en-US" dirty="0"/>
+              <a:t> </a:t>
+            </a:r>
+            <a:r>
+              <a:rPr lang="en-US" dirty="0" err="1"/>
+              <a:t>liệu</a:t>
+            </a:r>
+            <a:r>
+              <a:rPr lang="en-US" dirty="0"/>
+              <a:t> </a:t>
+            </a:r>
+            <a:r>
+              <a:rPr lang="en-US" dirty="0" err="1"/>
+              <a:t>liên</a:t>
+            </a:r>
+            <a:r>
+              <a:rPr lang="en-US" dirty="0"/>
+              <a:t> </a:t>
+            </a:r>
+            <a:r>
+              <a:rPr lang="en-US" dirty="0" err="1"/>
+              <a:t>quan</a:t>
+            </a:r>
+            <a:r>
+              <a:rPr lang="en-US" dirty="0"/>
+              <a:t>)</a:t>
+            </a:r>
+          </a:p>
+          <a:p>
+            <a:pPr marL="571500" lvl="1" indent="0">
+              <a:buNone/>
+            </a:pPr>
+            <a:r>
+              <a:rPr lang="en-US" dirty="0"/>
+              <a:t>+ </a:t>
+            </a:r>
+            <a:r>
+              <a:rPr lang="en-US" dirty="0" err="1"/>
+              <a:t>Lắng</a:t>
+            </a:r>
+            <a:r>
+              <a:rPr lang="en-US" dirty="0"/>
+              <a:t> </a:t>
+            </a:r>
+            <a:r>
+              <a:rPr lang="en-US" dirty="0" err="1"/>
+              <a:t>nghe</a:t>
+            </a:r>
+            <a:r>
+              <a:rPr lang="en-US" dirty="0"/>
+              <a:t> </a:t>
+            </a:r>
+            <a:r>
+              <a:rPr lang="en-US" dirty="0" err="1"/>
+              <a:t>phản</a:t>
+            </a:r>
+            <a:r>
+              <a:rPr lang="en-US" dirty="0"/>
+              <a:t> </a:t>
+            </a:r>
+            <a:r>
+              <a:rPr lang="en-US" dirty="0" err="1"/>
+              <a:t>hồi</a:t>
+            </a:r>
+            <a:r>
+              <a:rPr lang="en-US" dirty="0"/>
+              <a:t> </a:t>
+            </a:r>
+            <a:r>
+              <a:rPr lang="en-US" dirty="0" err="1"/>
+              <a:t>từ</a:t>
+            </a:r>
+            <a:r>
+              <a:rPr lang="en-US" dirty="0"/>
+              <a:t> </a:t>
+            </a:r>
+            <a:r>
+              <a:rPr lang="en-US" dirty="0" err="1"/>
+              <a:t>khách</a:t>
+            </a:r>
+            <a:r>
+              <a:rPr lang="en-US" dirty="0"/>
+              <a:t> </a:t>
+            </a:r>
+            <a:r>
+              <a:rPr lang="en-US" dirty="0" err="1"/>
+              <a:t>hàng</a:t>
+            </a:r>
+            <a:endParaRPr lang="en-US" dirty="0"/>
+          </a:p>
+          <a:p>
+            <a:pPr marL="571500" lvl="1" indent="0">
+              <a:buNone/>
+            </a:pPr>
+            <a:r>
+              <a:rPr lang="en-US" dirty="0"/>
+              <a:t>+ </a:t>
+            </a:r>
+            <a:r>
+              <a:rPr lang="en-US" dirty="0" err="1"/>
+              <a:t>Sửa</a:t>
+            </a:r>
+            <a:r>
+              <a:rPr lang="en-US" dirty="0"/>
+              <a:t> </a:t>
+            </a:r>
+            <a:r>
+              <a:rPr lang="en-US" dirty="0" err="1"/>
+              <a:t>đổi</a:t>
+            </a:r>
+            <a:r>
+              <a:rPr lang="en-US" dirty="0"/>
+              <a:t> </a:t>
+            </a:r>
+            <a:r>
+              <a:rPr lang="en-US" dirty="0" err="1"/>
+              <a:t>biểu</a:t>
+            </a:r>
+            <a:r>
+              <a:rPr lang="en-US" dirty="0"/>
+              <a:t> </a:t>
+            </a:r>
+            <a:r>
+              <a:rPr lang="en-US" dirty="0" err="1"/>
+              <a:t>đồ</a:t>
+            </a:r>
+            <a:r>
+              <a:rPr lang="en-US" dirty="0"/>
+              <a:t> ca </a:t>
+            </a:r>
+            <a:r>
+              <a:rPr lang="en-US" dirty="0" err="1"/>
+              <a:t>sử</a:t>
+            </a:r>
+            <a:r>
+              <a:rPr lang="en-US" dirty="0"/>
+              <a:t> </a:t>
+            </a:r>
+            <a:r>
+              <a:rPr lang="en-US" dirty="0" err="1"/>
+              <a:t>dụng</a:t>
+            </a:r>
+            <a:r>
+              <a:rPr lang="en-US" dirty="0"/>
+              <a:t> </a:t>
+            </a:r>
+            <a:r>
+              <a:rPr lang="en-US" dirty="0" err="1"/>
+              <a:t>theo</a:t>
+            </a:r>
+            <a:r>
+              <a:rPr lang="en-US" dirty="0"/>
+              <a:t> </a:t>
+            </a:r>
+            <a:r>
+              <a:rPr lang="en-US" dirty="0" err="1"/>
+              <a:t>yêu</a:t>
+            </a:r>
+            <a:r>
+              <a:rPr lang="en-US" dirty="0"/>
+              <a:t> </a:t>
+            </a:r>
+            <a:r>
+              <a:rPr lang="en-US" dirty="0" err="1"/>
+              <a:t>cầu</a:t>
+            </a:r>
+            <a:r>
+              <a:rPr lang="en-US" dirty="0"/>
+              <a:t> </a:t>
+            </a:r>
+            <a:r>
+              <a:rPr lang="en-US" dirty="0" err="1"/>
+              <a:t>khách</a:t>
+            </a:r>
+            <a:r>
+              <a:rPr lang="en-US" dirty="0"/>
+              <a:t> </a:t>
+            </a:r>
+            <a:r>
+              <a:rPr lang="en-US" dirty="0" err="1"/>
+              <a:t>hàng</a:t>
+            </a:r>
+            <a:endParaRPr lang="en-US" dirty="0"/>
+          </a:p>
+          <a:p>
+            <a:pPr marL="571500" lvl="1" indent="0">
+              <a:buNone/>
+            </a:pPr>
+            <a:r>
+              <a:rPr lang="en-US" dirty="0"/>
+              <a:t>+ </a:t>
+            </a:r>
+            <a:r>
+              <a:rPr lang="en-US" dirty="0" err="1"/>
+              <a:t>Hoàn</a:t>
+            </a:r>
+            <a:r>
+              <a:rPr lang="en-US" dirty="0"/>
+              <a:t> </a:t>
+            </a:r>
+            <a:r>
+              <a:rPr lang="en-US" dirty="0" err="1"/>
+              <a:t>tất</a:t>
+            </a:r>
+            <a:r>
+              <a:rPr lang="en-US" dirty="0"/>
+              <a:t> b</a:t>
             </a:r>
             <a:r>
               <a:rPr lang="vi-VN" dirty="0"/>
-              <a:t>hoặc thay đổi các thông tin nếu cần thiết.</a:t>
-            </a:r>
+              <a:t>ư</a:t>
+            </a:r>
+            <a:r>
+              <a:rPr lang="en-US" dirty="0" err="1"/>
+              <a:t>ớc</a:t>
+            </a:r>
+            <a:r>
+              <a:rPr lang="en-US" dirty="0"/>
+              <a:t> </a:t>
+            </a:r>
+            <a:r>
+              <a:rPr lang="en-US" dirty="0" err="1"/>
+              <a:t>xác</a:t>
+            </a:r>
+            <a:r>
+              <a:rPr lang="en-US" dirty="0"/>
+              <a:t> </a:t>
+            </a:r>
+            <a:r>
+              <a:rPr lang="en-US" dirty="0" err="1"/>
+              <a:t>nhận</a:t>
+            </a:r>
+            <a:r>
+              <a:rPr lang="en-US" dirty="0"/>
+              <a:t> (</a:t>
+            </a:r>
+            <a:r>
+              <a:rPr lang="en-US" dirty="0" err="1"/>
+              <a:t>khách</a:t>
+            </a:r>
+            <a:r>
+              <a:rPr lang="en-US" dirty="0"/>
+              <a:t> </a:t>
+            </a:r>
+            <a:r>
+              <a:rPr lang="en-US" dirty="0" err="1"/>
+              <a:t>hàng</a:t>
+            </a:r>
+            <a:r>
+              <a:rPr lang="en-US" dirty="0"/>
+              <a:t> </a:t>
+            </a:r>
+            <a:r>
+              <a:rPr lang="en-US" dirty="0" err="1"/>
+              <a:t>và</a:t>
+            </a:r>
+            <a:r>
+              <a:rPr lang="en-US" dirty="0"/>
+              <a:t> </a:t>
+            </a:r>
+            <a:r>
+              <a:rPr lang="en-US" dirty="0" err="1"/>
+              <a:t>nhà</a:t>
+            </a:r>
+            <a:r>
+              <a:rPr lang="en-US" dirty="0"/>
+              <a:t> </a:t>
+            </a:r>
+            <a:r>
+              <a:rPr lang="en-US" dirty="0" err="1"/>
+              <a:t>phát</a:t>
+            </a:r>
+            <a:r>
+              <a:rPr lang="en-US" dirty="0"/>
+              <a:t> </a:t>
+            </a:r>
+            <a:r>
+              <a:rPr lang="en-US" dirty="0" err="1"/>
+              <a:t>triển</a:t>
+            </a:r>
+            <a:r>
+              <a:rPr lang="en-US" dirty="0"/>
+              <a:t> </a:t>
+            </a:r>
+            <a:r>
+              <a:rPr lang="en-US" dirty="0" err="1"/>
+              <a:t>đã</a:t>
+            </a:r>
+            <a:r>
+              <a:rPr lang="en-US" dirty="0"/>
+              <a:t> </a:t>
+            </a:r>
+            <a:r>
+              <a:rPr lang="en-US" dirty="0" err="1"/>
+              <a:t>đạt</a:t>
+            </a:r>
+            <a:r>
+              <a:rPr lang="en-US" dirty="0"/>
+              <a:t> đ</a:t>
+            </a:r>
+            <a:r>
+              <a:rPr lang="vi-VN" dirty="0"/>
+              <a:t>ư</a:t>
+            </a:r>
+            <a:r>
+              <a:rPr lang="en-US" dirty="0" err="1"/>
+              <a:t>ợc</a:t>
+            </a:r>
+            <a:r>
+              <a:rPr lang="en-US" dirty="0"/>
+              <a:t> </a:t>
+            </a:r>
+            <a:r>
+              <a:rPr lang="en-US" dirty="0" err="1"/>
+              <a:t>sự</a:t>
+            </a:r>
+            <a:r>
+              <a:rPr lang="en-US" dirty="0"/>
+              <a:t> </a:t>
+            </a:r>
+            <a:r>
+              <a:rPr lang="en-US" dirty="0" err="1"/>
+              <a:t>thống</a:t>
+            </a:r>
+            <a:r>
+              <a:rPr lang="en-US" dirty="0"/>
+              <a:t> </a:t>
+            </a:r>
+            <a:r>
+              <a:rPr lang="en-US" dirty="0" err="1"/>
+              <a:t>nhất</a:t>
+            </a:r>
+            <a:r>
+              <a:rPr lang="en-US" dirty="0"/>
+              <a:t>)</a:t>
+            </a:r>
+          </a:p>
+          <a:p>
+            <a:pPr>
+              <a:buFont typeface="Arial" panose="020B0604020202020204" pitchFamily="34" charset="0"/>
+              <a:buChar char="•"/>
+            </a:pPr>
             <a:endParaRPr lang="en-US" dirty="0"/>
           </a:p>
           <a:p>

</xml_diff>